<commit_message>
Adds fluxe information to presentation
</commit_message>
<xml_diff>
--- a/presentation/presentation.pptx
+++ b/presentation/presentation.pptx
@@ -5314,8 +5314,38 @@
         </p:blipFill>
         <p:spPr>
           <a:xfrm>
-            <a:off x="1822215" y="2157044"/>
+            <a:off x="1744999" y="1714068"/>
             <a:ext cx="3180569" cy="2543911"/>
+          </a:xfrm>
+          <a:prstGeom prst="rect">
+            <a:avLst/>
+          </a:prstGeom>
+        </p:spPr>
+      </p:pic>
+      <p:pic>
+        <p:nvPicPr>
+          <p:cNvPr id="3" name="Imagen 2" descr="Diagrama&#10;&#10;Descripción generada automáticamente">
+            <a:extLst>
+              <a:ext uri="{FF2B5EF4-FFF2-40B4-BE49-F238E27FC236}">
+                <a16:creationId xmlns:a16="http://schemas.microsoft.com/office/drawing/2014/main" id="{2A45A3DB-7502-FA60-DEB2-FF32E6064A8E}"/>
+              </a:ext>
+            </a:extLst>
+          </p:cNvPr>
+          <p:cNvPicPr>
+            <a:picLocks noChangeAspect="1"/>
+          </p:cNvPicPr>
+          <p:nvPr/>
+        </p:nvPicPr>
+        <p:blipFill>
+          <a:blip r:embed="rId3"/>
+          <a:stretch>
+            <a:fillRect/>
+          </a:stretch>
+        </p:blipFill>
+        <p:spPr>
+          <a:xfrm>
+            <a:off x="7404544" y="1513395"/>
+            <a:ext cx="3381375" cy="4010025"/>
           </a:xfrm>
           <a:prstGeom prst="rect">
             <a:avLst/>
@@ -13303,15 +13333,6 @@
 </file>
 
 <file path=customXml/item1.xml><?xml version="1.0" encoding="utf-8"?>
-<?mso-contentType ?>
-<FormTemplates xmlns="http://schemas.microsoft.com/sharepoint/v3/contenttype/forms">
-  <Display>DocumentLibraryForm</Display>
-  <Edit>DocumentLibraryForm</Edit>
-  <New>DocumentLibraryForm</New>
-</FormTemplates>
-</file>
-
-<file path=customXml/item2.xml><?xml version="1.0" encoding="utf-8"?>
 <ct:contentTypeSchema xmlns:ct="http://schemas.microsoft.com/office/2006/metadata/contentType" xmlns:ma="http://schemas.microsoft.com/office/2006/metadata/properties/metaAttributes" ct:_="" ma:_="" ma:contentTypeName="Document" ma:contentTypeID="0x01010079F111ED35F8CC479449609E8A0923A6" ma:contentTypeVersion="12" ma:contentTypeDescription="Create a new document." ma:contentTypeScope="" ma:versionID="426e97fa315356fffbdcd9876fe988c2">
   <xsd:schema xmlns:xsd="http://www.w3.org/2001/XMLSchema" xmlns:xs="http://www.w3.org/2001/XMLSchema" xmlns:p="http://schemas.microsoft.com/office/2006/metadata/properties" xmlns:ns2="71af3243-3dd4-4a8d-8c0d-dd76da1f02a5" xmlns:ns3="16c05727-aa75-4e4a-9b5f-8a80a1165891" targetNamespace="http://schemas.microsoft.com/office/2006/metadata/properties" ma:root="true" ma:fieldsID="14b8f0def80e6d70ce3def20c90759ae" ns2:_="" ns3:_="">
     <xsd:import namespace="71af3243-3dd4-4a8d-8c0d-dd76da1f02a5"/>
@@ -13532,6 +13553,15 @@
 </ct:contentTypeSchema>
 </file>
 
+<file path=customXml/item2.xml><?xml version="1.0" encoding="utf-8"?>
+<?mso-contentType ?>
+<FormTemplates xmlns="http://schemas.microsoft.com/sharepoint/v3/contenttype/forms">
+  <Display>DocumentLibraryForm</Display>
+  <Edit>DocumentLibraryForm</Edit>
+  <New>DocumentLibraryForm</New>
+</FormTemplates>
+</file>
+
 <file path=customXml/item3.xml><?xml version="1.0" encoding="utf-8"?>
 <p:properties xmlns:p="http://schemas.microsoft.com/office/2006/metadata/properties" xmlns:xsi="http://www.w3.org/2001/XMLSchema-instance" xmlns:pc="http://schemas.microsoft.com/office/infopath/2007/PartnerControls">
   <documentManagement>
@@ -13542,14 +13572,6 @@
 </file>
 
 <file path=customXml/itemProps1.xml><?xml version="1.0" encoding="utf-8"?>
-<ds:datastoreItem xmlns:ds="http://schemas.openxmlformats.org/officeDocument/2006/customXml" ds:itemID="{466BA265-3C9C-41FF-80C6-61A7F961C0DC}">
-  <ds:schemaRefs>
-    <ds:schemaRef ds:uri="http://schemas.microsoft.com/sharepoint/v3/contenttype/forms"/>
-  </ds:schemaRefs>
-</ds:datastoreItem>
-</file>
-
-<file path=customXml/itemProps2.xml><?xml version="1.0" encoding="utf-8"?>
 <ds:datastoreItem xmlns:ds="http://schemas.openxmlformats.org/officeDocument/2006/customXml" ds:itemID="{5055BC56-8FA3-435B-ACDD-0E8E6241EF63}">
   <ds:schemaRefs>
     <ds:schemaRef ds:uri="http://schemas.microsoft.com/office/2006/metadata/contentType"/>
@@ -13568,6 +13590,14 @@
 </ds:datastoreItem>
 </file>
 
+<file path=customXml/itemProps2.xml><?xml version="1.0" encoding="utf-8"?>
+<ds:datastoreItem xmlns:ds="http://schemas.openxmlformats.org/officeDocument/2006/customXml" ds:itemID="{466BA265-3C9C-41FF-80C6-61A7F961C0DC}">
+  <ds:schemaRefs>
+    <ds:schemaRef ds:uri="http://schemas.microsoft.com/sharepoint/v3/contenttype/forms"/>
+  </ds:schemaRefs>
+</ds:datastoreItem>
+</file>
+
 <file path=customXml/itemProps3.xml><?xml version="1.0" encoding="utf-8"?>
 <ds:datastoreItem xmlns:ds="http://schemas.openxmlformats.org/officeDocument/2006/customXml" ds:itemID="{B211B2B9-8CE5-4E5A-B70F-6B056FE844E8}">
   <ds:schemaRefs>

</xml_diff>